<commit_message>
Updated version after a few tweaks
</commit_message>
<xml_diff>
--- a/Presentations/NoBugs-WP/NoBugsReducedSize.pptx
+++ b/Presentations/NoBugs-WP/NoBugsReducedSize.pptx
@@ -18243,7 +18243,7 @@
           <a:p>
             <a:fld id="{E09F57FC-B3FF-4DF2-9417-962901C07B3B}" type="datetimeFigureOut">
               <a:rPr lang="sv-SE" smtClean="0"/>
-              <a:t>14/10/16</a:t>
+              <a:t>15/10/16</a:t>
             </a:fld>
             <a:endParaRPr lang="sv-SE" dirty="0"/>
           </a:p>
@@ -18784,7 +18784,7 @@
           <a:p>
             <a:fld id="{5ED7AC81-318B-4D49-A602-9E30227C87EC}" type="datetime1">
               <a:rPr lang="sv-SE" smtClean="0"/>
-              <a:t>14/10/16</a:t>
+              <a:t>15/10/16</a:t>
             </a:fld>
             <a:endParaRPr lang="sv-SE" dirty="0"/>
           </a:p>
@@ -19076,7 +19076,7 @@
           <a:p>
             <a:fld id="{6EB99CB0-346B-43FA-9EE6-F90C3F3BC0BA}" type="datetime1">
               <a:rPr lang="sv-SE" smtClean="0"/>
-              <a:t>14/10/16</a:t>
+              <a:t>15/10/16</a:t>
             </a:fld>
             <a:endParaRPr lang="sv-SE" dirty="0"/>
           </a:p>
@@ -19466,7 +19466,7 @@
           <a:p>
             <a:fld id="{42E66B7F-8271-49DA-A25A-F4BB9F476347}" type="datetime1">
               <a:rPr lang="sv-SE" smtClean="0"/>
-              <a:t>14/10/16</a:t>
+              <a:t>15/10/16</a:t>
             </a:fld>
             <a:endParaRPr lang="sv-SE" dirty="0"/>
           </a:p>
@@ -19918,7 +19918,7 @@
           <a:p>
             <a:fld id="{3C7D23FA-05C4-4CC1-B281-2F815585BC1C}" type="datetime1">
               <a:rPr lang="sv-SE" smtClean="0"/>
-              <a:t>14/10/16</a:t>
+              <a:t>15/10/16</a:t>
             </a:fld>
             <a:endParaRPr lang="sv-SE" dirty="0"/>
           </a:p>
@@ -20179,7 +20179,7 @@
           <a:p>
             <a:fld id="{7103233B-D569-4A6E-878F-CDE152514C47}" type="datetime1">
               <a:rPr lang="sv-SE" smtClean="0"/>
-              <a:t>14/10/16</a:t>
+              <a:t>15/10/16</a:t>
             </a:fld>
             <a:endParaRPr lang="sv-SE" dirty="0"/>
           </a:p>
@@ -20719,11 +20719,6 @@
               </a:rPr>
               <a:t>European Spallation Source, ERIC</a:t>
             </a:r>
-            <a:endParaRPr lang="en-GB" sz="2000" noProof="0" dirty="0" smtClean="0">
-              <a:solidFill>
-                <a:schemeClr val="bg1"/>
-              </a:solidFill>
-            </a:endParaRPr>
           </a:p>
           <a:p>
             <a:endParaRPr lang="en-GB" sz="2000" noProof="0" dirty="0">
@@ -20782,7 +20777,7 @@
                   <a:srgbClr val="FFFFFF"/>
                 </a:solidFill>
               </a:rPr>
-              <a:t>14 October 2016</a:t>
+              <a:t>15 October 2016</a:t>
             </a:fld>
             <a:endParaRPr lang="en-GB" sz="1400" dirty="0" smtClean="0">
               <a:solidFill>
@@ -21860,17 +21855,8 @@
           <a:p>
             <a:r>
               <a:rPr lang="en-US" sz="1600" dirty="0" smtClean="0"/>
-              <a:t>Available </a:t>
-            </a:r>
-            <a:r>
-              <a:rPr lang="en-US" sz="1600" dirty="0" smtClean="0"/>
-              <a:t>from</a:t>
-            </a:r>
-            <a:r>
-              <a:rPr lang="en-US" sz="1600" dirty="0" smtClean="0"/>
-              <a:t>:</a:t>
-            </a:r>
-            <a:endParaRPr lang="en-US" sz="1600" dirty="0" smtClean="0"/>
+              <a:t>Available from:</a:t>
+            </a:r>
           </a:p>
           <a:p>
             <a:r>
@@ -22826,7 +22812,7 @@
         <p:spPr>
           <a:xfrm>
             <a:off x="4601480" y="3995772"/>
-            <a:ext cx="1227582" cy="369332"/>
+            <a:ext cx="1137301" cy="369332"/>
           </a:xfrm>
           <a:prstGeom prst="rect">
             <a:avLst/>
@@ -22840,12 +22826,8 @@
           <a:lstStyle/>
           <a:p>
             <a:r>
-              <a:rPr lang="en-US" dirty="0" err="1" smtClean="0"/>
-              <a:t>Prosposed</a:t>
-            </a:r>
-            <a:r>
               <a:rPr lang="en-US" dirty="0" smtClean="0"/>
-              <a:t>:</a:t>
+              <a:t>Proposed:</a:t>
             </a:r>
             <a:endParaRPr lang="en-US" dirty="0"/>
           </a:p>
@@ -23608,7 +23590,7 @@
         </p:nvSpPr>
         <p:spPr>
           <a:xfrm>
-            <a:off x="0" y="1988840"/>
+            <a:off x="0" y="2011165"/>
             <a:ext cx="5220072" cy="3506067"/>
           </a:xfrm>
           <a:prstGeom prst="rect">
@@ -23874,23 +23856,7 @@
                   <a:schemeClr val="tx1"/>
                 </a:solidFill>
               </a:rPr>
-              <a:t>Long </a:t>
-            </a:r>
-            <a:r>
-              <a:rPr lang="en-US" sz="2400" dirty="0">
-                <a:solidFill>
-                  <a:schemeClr val="tx1"/>
-                </a:solidFill>
-              </a:rPr>
-              <a:t>term </a:t>
-            </a:r>
-            <a:r>
-              <a:rPr lang="en-US" sz="2400" dirty="0" smtClean="0">
-                <a:solidFill>
-                  <a:schemeClr val="tx1"/>
-                </a:solidFill>
-              </a:rPr>
-              <a:t>maintainability</a:t>
+              <a:t>Maintainability and reliability </a:t>
             </a:r>
           </a:p>
           <a:p>
@@ -23933,32 +23899,6 @@
                 </a:solidFill>
               </a:rPr>
               <a:t>)</a:t>
-            </a:r>
-          </a:p>
-          <a:p>
-            <a:r>
-              <a:rPr lang="en-US" sz="2400" dirty="0" smtClean="0">
-                <a:solidFill>
-                  <a:schemeClr val="tx1"/>
-                </a:solidFill>
-              </a:rPr>
-              <a:t>Clean </a:t>
-            </a:r>
-            <a:r>
-              <a:rPr lang="en-US" sz="2400" dirty="0">
-                <a:solidFill>
-                  <a:schemeClr val="tx1"/>
-                </a:solidFill>
-              </a:rPr>
-              <a:t>separation of UI and </a:t>
-            </a:r>
-            <a:r>
-              <a:rPr lang="en-US" sz="2400" dirty="0" smtClean="0">
-                <a:solidFill>
-                  <a:schemeClr val="tx1"/>
-                </a:solidFill>
-              </a:rPr>
-              <a:t>code</a:t>
             </a:r>
           </a:p>
           <a:p>
@@ -24400,20 +24340,12 @@
           </a:p>
           <a:p>
             <a:r>
-              <a:rPr lang="en-US" sz="2200" dirty="0">
-                <a:solidFill>
-                  <a:schemeClr val="tx1"/>
-                </a:solidFill>
-              </a:rPr>
-              <a:t>Fitting </a:t>
-            </a:r>
-            <a:r>
               <a:rPr lang="en-US" sz="2200" dirty="0" smtClean="0">
                 <a:solidFill>
                   <a:schemeClr val="tx1"/>
                 </a:solidFill>
               </a:rPr>
-              <a:t>and P</a:t>
+              <a:t>P</a:t>
             </a:r>
             <a:r>
               <a:rPr lang="en-US" sz="2200" dirty="0">
@@ -24429,7 +24361,7 @@
                   <a:schemeClr val="tx1"/>
                 </a:solidFill>
               </a:rPr>
-              <a:t>panels</a:t>
+              <a:t>perspective</a:t>
             </a:r>
           </a:p>
           <a:p>
@@ -24852,29 +24784,16 @@
                   <a:schemeClr val="tx1"/>
                 </a:solidFill>
               </a:rPr>
-              <a:t>Planned support for multiple CPUs/GPUs</a:t>
-            </a:r>
-          </a:p>
-          <a:p>
+              <a:t>Planned support for multiple CPUs/</a:t>
+            </a:r>
             <a:r>
               <a:rPr lang="en-US" sz="2400" dirty="0" smtClean="0">
                 <a:solidFill>
                   <a:schemeClr val="tx1"/>
                 </a:solidFill>
               </a:rPr>
-              <a:t>Further optimization and testing </a:t>
-            </a:r>
-            <a:endParaRPr lang="en-US" sz="2400" dirty="0">
-              <a:solidFill>
-                <a:schemeClr val="tx1"/>
-              </a:solidFill>
-            </a:endParaRPr>
-          </a:p>
-          <a:p>
-            <a:pPr marL="285750" indent="-285750">
-              <a:buFontTx/>
-              <a:buChar char="-"/>
-            </a:pPr>
+              <a:t>GPUs</a:t>
+            </a:r>
             <a:endParaRPr lang="en-US" dirty="0" smtClean="0"/>
           </a:p>
           <a:p>
@@ -25971,11 +25890,15 @@
             </a:r>
             <a:r>
               <a:rPr lang="en-US" dirty="0" err="1" smtClean="0"/>
-              <a:t>SasModels</a:t>
+              <a:t>SasView</a:t>
             </a:r>
             <a:r>
               <a:rPr lang="en-US" dirty="0" smtClean="0"/>
-              <a:t> functions (</a:t>
+              <a:t> </a:t>
+            </a:r>
+            <a:r>
+              <a:rPr lang="en-US" dirty="0" smtClean="0"/>
+              <a:t>functions (</a:t>
             </a:r>
             <a:r>
               <a:rPr lang="en-US" dirty="0" err="1" smtClean="0"/>
@@ -26455,11 +26378,19 @@
             </a:pPr>
             <a:r>
               <a:rPr lang="en-US" sz="2200" dirty="0" smtClean="0"/>
-              <a:t>Robust </a:t>
+              <a:t>Robust and </a:t>
+            </a:r>
+            <a:r>
+              <a:rPr lang="en-US" sz="2200" dirty="0" err="1" smtClean="0"/>
+              <a:t>firendly</a:t>
             </a:r>
             <a:r>
               <a:rPr lang="en-US" sz="2200" dirty="0" smtClean="0"/>
-              <a:t>and easy interface</a:t>
+              <a:t> </a:t>
+            </a:r>
+            <a:r>
+              <a:rPr lang="en-US" sz="2200" dirty="0" smtClean="0"/>
+              <a:t>interface</a:t>
             </a:r>
           </a:p>
           <a:p>
@@ -26479,11 +26410,7 @@
             </a:r>
             <a:r>
               <a:rPr lang="en-US" sz="2200" dirty="0" smtClean="0"/>
-              <a:t>p</a:t>
-            </a:r>
-            <a:r>
-              <a:rPr lang="en-US" sz="2200" dirty="0" smtClean="0"/>
-              <a:t>-to-date documentation</a:t>
+              <a:t>p-to-date documentation</a:t>
             </a:r>
           </a:p>
           <a:p>
@@ -27508,7 +27435,7 @@
         <p:spPr/>
         <p:txBody>
           <a:bodyPr>
-            <a:normAutofit fontScale="92500" lnSpcReduction="10000"/>
+            <a:normAutofit/>
           </a:bodyPr>
           <a:lstStyle/>
           <a:p>
@@ -27545,14 +27472,14 @@
                 <a:latin typeface="Arial"/>
                 <a:cs typeface="Arial"/>
               </a:rPr>
-              <a:t>collaboratively developed software for the analysis and the modeling of small angle </a:t>
+              <a:t>collaboratively developed software for the analysis and the modeling of </a:t>
             </a:r>
             <a:r>
               <a:rPr lang="en-US" sz="2400" dirty="0" smtClean="0">
                 <a:latin typeface="Arial"/>
                 <a:cs typeface="Arial"/>
               </a:rPr>
-              <a:t>scattering</a:t>
+              <a:t>SAS data</a:t>
             </a:r>
           </a:p>
           <a:p>
@@ -27568,16 +27495,14 @@
                 <a:latin typeface="Arial"/>
                 <a:cs typeface="Arial"/>
               </a:rPr>
-              <a:t> 4.0 is out!</a:t>
-            </a:r>
-          </a:p>
-          <a:p>
+              <a:t> </a:t>
+            </a:r>
             <a:r>
               <a:rPr lang="en-US" sz="2400" dirty="0" smtClean="0">
                 <a:latin typeface="Arial"/>
                 <a:cs typeface="Arial"/>
               </a:rPr>
-              <a:t>Sine2020 efforts involve:</a:t>
+              <a:t>in Sine2020 project</a:t>
             </a:r>
           </a:p>
           <a:p>
@@ -27607,46 +27532,50 @@
                 <a:latin typeface="Arial"/>
                 <a:cs typeface="Arial"/>
               </a:rPr>
-              <a:t>Extension with new models</a:t>
-            </a:r>
-          </a:p>
-          <a:p>
-            <a:r>
-              <a:rPr lang="en-US" sz="2400" dirty="0" smtClean="0">
-                <a:latin typeface="Arial"/>
-                <a:cs typeface="Arial"/>
-              </a:rPr>
-              <a:t>Our goals:</a:t>
-            </a:r>
-          </a:p>
-          <a:p>
-            <a:pPr lvl="1"/>
+              <a:t>Extension with new </a:t>
+            </a:r>
             <a:r>
               <a:rPr lang="en-US" sz="2000" dirty="0" smtClean="0">
                 <a:latin typeface="Arial"/>
                 <a:cs typeface="Arial"/>
               </a:rPr>
-              <a:t>Easier maintainability </a:t>
-            </a:r>
-          </a:p>
-          <a:p>
-            <a:pPr lvl="1"/>
-            <a:r>
-              <a:rPr lang="en-US" sz="2000" dirty="0" smtClean="0">
+              <a:t>models</a:t>
+            </a:r>
+            <a:endParaRPr lang="en-US" sz="2000" dirty="0">
+              <a:latin typeface="Arial"/>
+              <a:cs typeface="Arial"/>
+            </a:endParaRPr>
+          </a:p>
+          <a:p>
+            <a:r>
+              <a:rPr lang="en-US" sz="2400" dirty="0" err="1">
                 <a:latin typeface="Arial"/>
                 <a:cs typeface="Arial"/>
               </a:rPr>
-              <a:t>Increased reliability </a:t>
-            </a:r>
-          </a:p>
-          <a:p>
-            <a:pPr lvl="1"/>
-            <a:r>
-              <a:rPr lang="en-US" sz="2000" dirty="0" smtClean="0">
+              <a:t>SasView</a:t>
+            </a:r>
+            <a:r>
+              <a:rPr lang="en-US" sz="2400" dirty="0">
                 <a:latin typeface="Arial"/>
                 <a:cs typeface="Arial"/>
               </a:rPr>
-              <a:t>Better user experience</a:t>
+              <a:t> 4.0 is out!</a:t>
+            </a:r>
+          </a:p>
+          <a:p>
+            <a:r>
+              <a:rPr lang="en-US" sz="2400" dirty="0" err="1">
+                <a:latin typeface="Arial"/>
+                <a:cs typeface="Arial"/>
+              </a:rPr>
+              <a:t>SasView</a:t>
+            </a:r>
+            <a:r>
+              <a:rPr lang="en-US" sz="2400" dirty="0">
+                <a:latin typeface="Arial"/>
+                <a:cs typeface="Arial"/>
+              </a:rPr>
+              <a:t> 4.1 is coming soon:</a:t>
             </a:r>
           </a:p>
           <a:p>
@@ -27656,16 +27585,19 @@
                 <a:latin typeface="Arial"/>
                 <a:cs typeface="Arial"/>
               </a:rPr>
-              <a:t>R</a:t>
-            </a:r>
-            <a:r>
-              <a:rPr lang="en-US" sz="2000" dirty="0" smtClean="0">
+              <a:t>Correlation functions</a:t>
+            </a:r>
+          </a:p>
+          <a:p>
+            <a:pPr lvl="1"/>
+            <a:r>
+              <a:rPr lang="en-US" sz="2000">
                 <a:latin typeface="Arial"/>
                 <a:cs typeface="Arial"/>
               </a:rPr>
-              <a:t>eal-time data analysis</a:t>
-            </a:r>
-            <a:endParaRPr lang="en-US" sz="2000" dirty="0">
+              <a:t>SESANS </a:t>
+            </a:r>
+            <a:endParaRPr lang="en-US" sz="1600">
               <a:latin typeface="Arial"/>
               <a:cs typeface="Arial"/>
             </a:endParaRPr>
@@ -27814,15 +27746,7 @@
             </a:r>
             <a:r>
               <a:rPr lang="en-US" dirty="0" smtClean="0"/>
-              <a:t> within </a:t>
-            </a:r>
-            <a:r>
-              <a:rPr lang="en-US" dirty="0" smtClean="0"/>
-              <a:t>SINE2020 </a:t>
-            </a:r>
-            <a:r>
-              <a:rPr lang="en-US" dirty="0" smtClean="0"/>
-              <a:t>project</a:t>
+              <a:t> within SINE2020 project</a:t>
             </a:r>
           </a:p>
           <a:p>
@@ -28291,6 +28215,37 @@
           </a:p>
           <a:p>
             <a:r>
+              <a:rPr lang="en-US" sz="2400" dirty="0"/>
+              <a:t>support </a:t>
+            </a:r>
+            <a:r>
+              <a:rPr lang="en-US" sz="2400" dirty="0" smtClean="0"/>
+              <a:t>for </a:t>
+            </a:r>
+            <a:r>
+              <a:rPr lang="en-US" sz="2400" dirty="0" err="1" smtClean="0"/>
+              <a:t>canSAS</a:t>
+            </a:r>
+            <a:r>
+              <a:rPr lang="en-US" sz="2400" dirty="0" smtClean="0"/>
+              <a:t> </a:t>
+            </a:r>
+            <a:r>
+              <a:rPr lang="en-US" sz="2400" dirty="0"/>
+              <a:t>XML &amp; </a:t>
+            </a:r>
+            <a:r>
+              <a:rPr lang="en-US" sz="2400" dirty="0" err="1"/>
+              <a:t>NXcanSAS</a:t>
+            </a:r>
+            <a:r>
+              <a:rPr lang="en-US" sz="2400" dirty="0"/>
+              <a:t> formats</a:t>
+            </a:r>
+            <a:endParaRPr lang="en-GB" sz="2400" dirty="0" smtClean="0"/>
+          </a:p>
+          <a:p>
+            <a:r>
               <a:rPr lang="en-GB" sz="2400" dirty="0" smtClean="0"/>
               <a:t>Form and structure factors </a:t>
             </a:r>
@@ -28330,13 +28285,9 @@
             </a:r>
           </a:p>
           <a:p>
-            <a:r>
-              <a:rPr lang="en-GB" sz="2400" dirty="0" smtClean="0"/>
-              <a:t>Plugin models </a:t>
-            </a:r>
-            <a:endParaRPr lang="en-GB" sz="2400" dirty="0"/>
-          </a:p>
-          <a:p>
+            <a:pPr marL="0" indent="0">
+              <a:buNone/>
+            </a:pPr>
             <a:endParaRPr lang="en-GB" dirty="0"/>
           </a:p>
         </p:txBody>
@@ -28561,7 +28512,6 @@
               <a:rPr lang="en-US" sz="2400" dirty="0" smtClean="0"/>
               <a:t>alculator</a:t>
             </a:r>
-            <a:endParaRPr lang="en-US" sz="2400" dirty="0" smtClean="0"/>
           </a:p>
           <a:p>
             <a:r>

</xml_diff>